<commit_message>
blue shift plots and initial daily f
</commit_message>
<xml_diff>
--- a/notes/red-shift.pptx
+++ b/notes/red-shift.pptx
@@ -5,13 +5,15 @@
     <p:sldMasterId id="2147483648" r:id="rId1"/>
   </p:sldMasterIdLst>
   <p:notesMasterIdLst>
-    <p:notesMasterId r:id="rId6"/>
+    <p:notesMasterId r:id="rId8"/>
   </p:notesMasterIdLst>
   <p:sldIdLst>
     <p:sldId id="256" r:id="rId2"/>
     <p:sldId id="257" r:id="rId3"/>
     <p:sldId id="258" r:id="rId4"/>
     <p:sldId id="259" r:id="rId5"/>
+    <p:sldId id="260" r:id="rId6"/>
+    <p:sldId id="261" r:id="rId7"/>
   </p:sldIdLst>
   <p:sldSz cx="12192000" cy="6858000"/>
   <p:notesSz cx="6858000" cy="9144000"/>
@@ -110,6 +112,11 @@
       </a:defRPr>
     </a:lvl9pPr>
   </p:defaultTextStyle>
+  <p:extLst>
+    <p:ext uri="{EFAFB233-063F-42B5-8137-9DF3F51BA10A}">
+      <p15:sldGuideLst xmlns:p15="http://schemas.microsoft.com/office/powerpoint/2012/main"/>
+    </p:ext>
+  </p:extLst>
 </p:presentation>
 </file>
 
@@ -195,7 +202,7 @@
           <a:p>
             <a:fld id="{7AD98EF8-CFA9-4676-BD58-D7378CE2F598}" type="datetimeFigureOut">
               <a:rPr lang="en-GB" smtClean="0"/>
-              <a:t>28/07/2023</a:t>
+              <a:t>04/08/2023</a:t>
             </a:fld>
             <a:endParaRPr lang="en-GB"/>
           </a:p>
@@ -719,7 +726,7 @@
           <a:p>
             <a:fld id="{25CE105C-5DAF-4174-BE16-B2E1F1F767CC}" type="datetimeFigureOut">
               <a:rPr lang="en-GB" smtClean="0"/>
-              <a:t>28/07/2023</a:t>
+              <a:t>04/08/2023</a:t>
             </a:fld>
             <a:endParaRPr lang="en-GB"/>
           </a:p>
@@ -919,7 +926,7 @@
           <a:p>
             <a:fld id="{25CE105C-5DAF-4174-BE16-B2E1F1F767CC}" type="datetimeFigureOut">
               <a:rPr lang="en-GB" smtClean="0"/>
-              <a:t>28/07/2023</a:t>
+              <a:t>04/08/2023</a:t>
             </a:fld>
             <a:endParaRPr lang="en-GB"/>
           </a:p>
@@ -1129,7 +1136,7 @@
           <a:p>
             <a:fld id="{25CE105C-5DAF-4174-BE16-B2E1F1F767CC}" type="datetimeFigureOut">
               <a:rPr lang="en-GB" smtClean="0"/>
-              <a:t>28/07/2023</a:t>
+              <a:t>04/08/2023</a:t>
             </a:fld>
             <a:endParaRPr lang="en-GB"/>
           </a:p>
@@ -1329,7 +1336,7 @@
           <a:p>
             <a:fld id="{25CE105C-5DAF-4174-BE16-B2E1F1F767CC}" type="datetimeFigureOut">
               <a:rPr lang="en-GB" smtClean="0"/>
-              <a:t>28/07/2023</a:t>
+              <a:t>04/08/2023</a:t>
             </a:fld>
             <a:endParaRPr lang="en-GB"/>
           </a:p>
@@ -1605,7 +1612,7 @@
           <a:p>
             <a:fld id="{25CE105C-5DAF-4174-BE16-B2E1F1F767CC}" type="datetimeFigureOut">
               <a:rPr lang="en-GB" smtClean="0"/>
-              <a:t>28/07/2023</a:t>
+              <a:t>04/08/2023</a:t>
             </a:fld>
             <a:endParaRPr lang="en-GB"/>
           </a:p>
@@ -1873,7 +1880,7 @@
           <a:p>
             <a:fld id="{25CE105C-5DAF-4174-BE16-B2E1F1F767CC}" type="datetimeFigureOut">
               <a:rPr lang="en-GB" smtClean="0"/>
-              <a:t>28/07/2023</a:t>
+              <a:t>04/08/2023</a:t>
             </a:fld>
             <a:endParaRPr lang="en-GB"/>
           </a:p>
@@ -2288,7 +2295,7 @@
           <a:p>
             <a:fld id="{25CE105C-5DAF-4174-BE16-B2E1F1F767CC}" type="datetimeFigureOut">
               <a:rPr lang="en-GB" smtClean="0"/>
-              <a:t>28/07/2023</a:t>
+              <a:t>04/08/2023</a:t>
             </a:fld>
             <a:endParaRPr lang="en-GB"/>
           </a:p>
@@ -2430,7 +2437,7 @@
           <a:p>
             <a:fld id="{25CE105C-5DAF-4174-BE16-B2E1F1F767CC}" type="datetimeFigureOut">
               <a:rPr lang="en-GB" smtClean="0"/>
-              <a:t>28/07/2023</a:t>
+              <a:t>04/08/2023</a:t>
             </a:fld>
             <a:endParaRPr lang="en-GB"/>
           </a:p>
@@ -2543,7 +2550,7 @@
           <a:p>
             <a:fld id="{25CE105C-5DAF-4174-BE16-B2E1F1F767CC}" type="datetimeFigureOut">
               <a:rPr lang="en-GB" smtClean="0"/>
-              <a:t>28/07/2023</a:t>
+              <a:t>04/08/2023</a:t>
             </a:fld>
             <a:endParaRPr lang="en-GB"/>
           </a:p>
@@ -2856,7 +2863,7 @@
           <a:p>
             <a:fld id="{25CE105C-5DAF-4174-BE16-B2E1F1F767CC}" type="datetimeFigureOut">
               <a:rPr lang="en-GB" smtClean="0"/>
-              <a:t>28/07/2023</a:t>
+              <a:t>04/08/2023</a:t>
             </a:fld>
             <a:endParaRPr lang="en-GB"/>
           </a:p>
@@ -3145,7 +3152,7 @@
           <a:p>
             <a:fld id="{25CE105C-5DAF-4174-BE16-B2E1F1F767CC}" type="datetimeFigureOut">
               <a:rPr lang="en-GB" smtClean="0"/>
-              <a:t>28/07/2023</a:t>
+              <a:t>04/08/2023</a:t>
             </a:fld>
             <a:endParaRPr lang="en-GB"/>
           </a:p>
@@ -3388,7 +3395,7 @@
           <a:p>
             <a:fld id="{25CE105C-5DAF-4174-BE16-B2E1F1F767CC}" type="datetimeFigureOut">
               <a:rPr lang="en-GB" smtClean="0"/>
-              <a:t>28/07/2023</a:t>
+              <a:t>04/08/2023</a:t>
             </a:fld>
             <a:endParaRPr lang="en-GB"/>
           </a:p>
@@ -4038,9 +4045,8 @@
               </a:ext>
             </a:extLst>
           </a:blip>
-          <a:stretch>
-            <a:fillRect/>
-          </a:stretch>
+          <a:srcRect/>
+          <a:stretch/>
         </p:blipFill>
         <p:spPr>
           <a:xfrm>
@@ -4279,6 +4285,227 @@
     <p:extLst>
       <p:ext uri="{BB962C8B-B14F-4D97-AF65-F5344CB8AC3E}">
         <p14:creationId xmlns:p14="http://schemas.microsoft.com/office/powerpoint/2010/main" val="3656329762"/>
+      </p:ext>
+    </p:extLst>
+  </p:cSld>
+  <p:clrMapOvr>
+    <a:masterClrMapping/>
+  </p:clrMapOvr>
+</p:sld>
+</file>
+
+<file path=ppt/slides/slide5.xml><?xml version="1.0" encoding="utf-8"?>
+<p:sld xmlns:a="http://schemas.openxmlformats.org/drawingml/2006/main" xmlns:r="http://schemas.openxmlformats.org/officeDocument/2006/relationships" xmlns:p="http://schemas.openxmlformats.org/presentationml/2006/main">
+  <p:cSld>
+    <p:spTree>
+      <p:nvGrpSpPr>
+        <p:cNvPr id="1" name=""/>
+        <p:cNvGrpSpPr/>
+        <p:nvPr/>
+      </p:nvGrpSpPr>
+      <p:grpSpPr>
+        <a:xfrm>
+          <a:off x="0" y="0"/>
+          <a:ext cx="0" cy="0"/>
+          <a:chOff x="0" y="0"/>
+          <a:chExt cx="0" cy="0"/>
+        </a:xfrm>
+      </p:grpSpPr>
+      <p:sp>
+        <p:nvSpPr>
+          <p:cNvPr id="2" name="Title 1">
+            <a:extLst>
+              <a:ext uri="{FF2B5EF4-FFF2-40B4-BE49-F238E27FC236}">
+                <a16:creationId xmlns:a16="http://schemas.microsoft.com/office/drawing/2014/main" id="{F7F6160A-C11E-5836-F44F-DE48AB6BA9DD}"/>
+              </a:ext>
+            </a:extLst>
+          </p:cNvPr>
+          <p:cNvSpPr>
+            <a:spLocks noGrp="1"/>
+          </p:cNvSpPr>
+          <p:nvPr>
+            <p:ph type="title"/>
+          </p:nvPr>
+        </p:nvSpPr>
+        <p:spPr/>
+        <p:txBody>
+          <a:bodyPr/>
+          <a:lstStyle/>
+          <a:p>
+            <a:r>
+              <a:rPr lang="en-GB" dirty="0"/>
+              <a:t>Comparing PSS calculated with j</a:t>
+            </a:r>
+            <a:r>
+              <a:rPr lang="en-GB" baseline="-25000" dirty="0"/>
+              <a:t>HNO3</a:t>
+            </a:r>
+            <a:r>
+              <a:rPr lang="en-GB" dirty="0"/>
+              <a:t> and j</a:t>
+            </a:r>
+            <a:r>
+              <a:rPr lang="en-GB" baseline="-25000" dirty="0"/>
+              <a:t>O1D</a:t>
+            </a:r>
+            <a:endParaRPr lang="en-GB" dirty="0"/>
+          </a:p>
+        </p:txBody>
+      </p:sp>
+      <p:pic>
+        <p:nvPicPr>
+          <p:cNvPr id="5" name="Graphic 4">
+            <a:extLst>
+              <a:ext uri="{FF2B5EF4-FFF2-40B4-BE49-F238E27FC236}">
+                <a16:creationId xmlns:a16="http://schemas.microsoft.com/office/drawing/2014/main" id="{054601C0-70CE-76A3-E96A-11528414E9EB}"/>
+              </a:ext>
+            </a:extLst>
+          </p:cNvPr>
+          <p:cNvPicPr>
+            <a:picLocks noChangeAspect="1"/>
+          </p:cNvPicPr>
+          <p:nvPr/>
+        </p:nvPicPr>
+        <p:blipFill>
+          <a:blip r:embed="rId2">
+            <a:extLst>
+              <a:ext uri="{28A0092B-C50C-407E-A947-70E740481C1C}">
+                <a14:useLocalDpi xmlns:a14="http://schemas.microsoft.com/office/drawing/2010/main" val="0"/>
+              </a:ext>
+              <a:ext uri="{96DAC541-7B7A-43D3-8B79-37D633B846F1}">
+                <asvg:svgBlip xmlns:asvg="http://schemas.microsoft.com/office/drawing/2016/SVG/main" r:embed="rId3"/>
+              </a:ext>
+            </a:extLst>
+          </a:blip>
+          <a:srcRect/>
+          <a:stretch/>
+        </p:blipFill>
+        <p:spPr>
+          <a:xfrm>
+            <a:off x="695325" y="1837096"/>
+            <a:ext cx="10801350" cy="4324350"/>
+          </a:xfrm>
+          <a:prstGeom prst="rect">
+            <a:avLst/>
+          </a:prstGeom>
+        </p:spPr>
+      </p:pic>
+    </p:spTree>
+    <p:extLst>
+      <p:ext uri="{BB962C8B-B14F-4D97-AF65-F5344CB8AC3E}">
+        <p14:creationId xmlns:p14="http://schemas.microsoft.com/office/powerpoint/2010/main" val="2745243077"/>
+      </p:ext>
+    </p:extLst>
+  </p:cSld>
+  <p:clrMapOvr>
+    <a:masterClrMapping/>
+  </p:clrMapOvr>
+</p:sld>
+</file>
+
+<file path=ppt/slides/slide6.xml><?xml version="1.0" encoding="utf-8"?>
+<p:sld xmlns:a="http://schemas.openxmlformats.org/drawingml/2006/main" xmlns:r="http://schemas.openxmlformats.org/officeDocument/2006/relationships" xmlns:p="http://schemas.openxmlformats.org/presentationml/2006/main">
+  <p:cSld>
+    <p:spTree>
+      <p:nvGrpSpPr>
+        <p:cNvPr id="1" name=""/>
+        <p:cNvGrpSpPr/>
+        <p:nvPr/>
+      </p:nvGrpSpPr>
+      <p:grpSpPr>
+        <a:xfrm>
+          <a:off x="0" y="0"/>
+          <a:ext cx="0" cy="0"/>
+          <a:chOff x="0" y="0"/>
+          <a:chExt cx="0" cy="0"/>
+        </a:xfrm>
+      </p:grpSpPr>
+      <p:sp>
+        <p:nvSpPr>
+          <p:cNvPr id="2" name="Title 1">
+            <a:extLst>
+              <a:ext uri="{FF2B5EF4-FFF2-40B4-BE49-F238E27FC236}">
+                <a16:creationId xmlns:a16="http://schemas.microsoft.com/office/drawing/2014/main" id="{EEFF5E36-4817-5784-E4F8-E7B69FED77D3}"/>
+              </a:ext>
+            </a:extLst>
+          </p:cNvPr>
+          <p:cNvSpPr>
+            <a:spLocks noGrp="1"/>
+          </p:cNvSpPr>
+          <p:nvPr>
+            <p:ph type="title"/>
+          </p:nvPr>
+        </p:nvSpPr>
+        <p:spPr/>
+        <p:txBody>
+          <a:bodyPr/>
+          <a:lstStyle/>
+          <a:p>
+            <a:r>
+              <a:rPr lang="en-GB" dirty="0"/>
+              <a:t>Diurnal of PSS calculated with j</a:t>
+            </a:r>
+            <a:r>
+              <a:rPr lang="en-GB" baseline="-25000" dirty="0"/>
+              <a:t>HNO3</a:t>
+            </a:r>
+            <a:r>
+              <a:rPr lang="en-GB" dirty="0"/>
+              <a:t> and j</a:t>
+            </a:r>
+            <a:r>
+              <a:rPr lang="en-GB" baseline="-25000" dirty="0"/>
+              <a:t>O1D</a:t>
+            </a:r>
+            <a:r>
+              <a:rPr lang="en-GB" dirty="0"/>
+              <a:t> </a:t>
+            </a:r>
+          </a:p>
+        </p:txBody>
+      </p:sp>
+      <p:pic>
+        <p:nvPicPr>
+          <p:cNvPr id="5" name="Graphic 4">
+            <a:extLst>
+              <a:ext uri="{FF2B5EF4-FFF2-40B4-BE49-F238E27FC236}">
+                <a16:creationId xmlns:a16="http://schemas.microsoft.com/office/drawing/2014/main" id="{675B0CA9-614F-2505-B89E-D78EE6063E00}"/>
+              </a:ext>
+            </a:extLst>
+          </p:cNvPr>
+          <p:cNvPicPr>
+            <a:picLocks noChangeAspect="1"/>
+          </p:cNvPicPr>
+          <p:nvPr/>
+        </p:nvPicPr>
+        <p:blipFill>
+          <a:blip r:embed="rId2">
+            <a:extLst>
+              <a:ext uri="{28A0092B-C50C-407E-A947-70E740481C1C}">
+                <a14:useLocalDpi xmlns:a14="http://schemas.microsoft.com/office/drawing/2010/main" val="0"/>
+              </a:ext>
+              <a:ext uri="{96DAC541-7B7A-43D3-8B79-37D633B846F1}">
+                <asvg:svgBlip xmlns:asvg="http://schemas.microsoft.com/office/drawing/2016/SVG/main" r:embed="rId3"/>
+              </a:ext>
+            </a:extLst>
+          </a:blip>
+          <a:srcRect/>
+          <a:stretch/>
+        </p:blipFill>
+        <p:spPr>
+          <a:xfrm>
+            <a:off x="695325" y="1690688"/>
+            <a:ext cx="10801350" cy="4324350"/>
+          </a:xfrm>
+          <a:prstGeom prst="rect">
+            <a:avLst/>
+          </a:prstGeom>
+        </p:spPr>
+      </p:pic>
+    </p:spTree>
+    <p:extLst>
+      <p:ext uri="{BB962C8B-B14F-4D97-AF65-F5344CB8AC3E}">
+        <p14:creationId xmlns:p14="http://schemas.microsoft.com/office/powerpoint/2010/main" val="3711157460"/>
       </p:ext>
     </p:extLst>
   </p:cSld>

</xml_diff>